<commit_message>
Update slide 3 presentation
</commit_message>
<xml_diff>
--- a/Elisa-3_presentation.pptx
+++ b/Elisa-3_presentation.pptx
@@ -134,7 +134,7 @@
   </p:defaultTextStyle>
   <p:extLst>
     <p:ext uri="{EFAFB233-063F-42B5-8137-9DF3F51BA10A}">
-      <p15:sldGuideLst xmlns="" xmlns:p15="http://schemas.microsoft.com/office/powerpoint/2012/main">
+      <p15:sldGuideLst xmlns:p15="http://schemas.microsoft.com/office/powerpoint/2012/main">
         <p15:guide id="1" orient="horz" pos="2160">
           <p15:clr>
             <a:srgbClr val="A4A3A4"/>
@@ -392,7 +392,7 @@
           <a:p>
             <a:fld id="{D2342ED9-9AD2-4080-9043-7045960B13BE}" type="slidenum">
               <a:rPr lang="fr-CH" smtClean="0"/>
-              <a:t>‹N›</a:t>
+              <a:t>‹#›</a:t>
             </a:fld>
             <a:endParaRPr lang="fr-CH"/>
           </a:p>
@@ -2984,7 +2984,7 @@
             <a:fld id="{D57F1E4F-1CFF-5643-939E-217C01CDF565}" type="slidenum">
               <a:rPr lang="en-US" smtClean="0"/>
               <a:pPr/>
-              <a:t>‹N›</a:t>
+              <a:t>‹#›</a:t>
             </a:fld>
             <a:endParaRPr lang="en-US" dirty="0"/>
           </a:p>
@@ -3311,7 +3311,7 @@
             <a:fld id="{D57F1E4F-1CFF-5643-939E-217C01CDF565}" type="slidenum">
               <a:rPr lang="en-US" smtClean="0"/>
               <a:pPr/>
-              <a:t>‹N›</a:t>
+              <a:t>‹#›</a:t>
             </a:fld>
             <a:endParaRPr lang="en-US" dirty="0"/>
           </a:p>
@@ -3801,7 +3801,7 @@
             <a:fld id="{D57F1E4F-1CFF-5643-939E-217C01CDF565}" type="slidenum">
               <a:rPr lang="en-US" smtClean="0"/>
               <a:pPr/>
-              <a:t>‹N›</a:t>
+              <a:t>‹#›</a:t>
             </a:fld>
             <a:endParaRPr lang="en-US" dirty="0"/>
           </a:p>
@@ -4172,7 +4172,7 @@
             <a:fld id="{D57F1E4F-1CFF-5643-939E-217C01CDF565}" type="slidenum">
               <a:rPr lang="en-US" smtClean="0"/>
               <a:pPr/>
-              <a:t>‹N›</a:t>
+              <a:t>‹#›</a:t>
             </a:fld>
             <a:endParaRPr lang="en-US" dirty="0"/>
           </a:p>
@@ -4447,7 +4447,7 @@
             <a:fld id="{D57F1E4F-1CFF-5643-939E-217C01CDF565}" type="slidenum">
               <a:rPr lang="en-US" smtClean="0"/>
               <a:pPr/>
-              <a:t>‹N›</a:t>
+              <a:t>‹#›</a:t>
             </a:fld>
             <a:endParaRPr lang="en-US" dirty="0"/>
           </a:p>
@@ -4734,7 +4734,7 @@
             <a:fld id="{D57F1E4F-1CFF-5643-939E-217C01CDF565}" type="slidenum">
               <a:rPr lang="en-US" smtClean="0"/>
               <a:pPr/>
-              <a:t>‹N›</a:t>
+              <a:t>‹#›</a:t>
             </a:fld>
             <a:endParaRPr lang="en-US" dirty="0"/>
           </a:p>
@@ -5146,7 +5146,7 @@
             <a:fld id="{D57F1E4F-1CFF-5643-939E-217C01CDF565}" type="slidenum">
               <a:rPr lang="en-US" smtClean="0"/>
               <a:pPr/>
-              <a:t>‹N›</a:t>
+              <a:t>‹#›</a:t>
             </a:fld>
             <a:endParaRPr lang="en-US" dirty="0"/>
           </a:p>
@@ -5498,7 +5498,7 @@
             <a:fld id="{D57F1E4F-1CFF-5643-939E-217C01CDF565}" type="slidenum">
               <a:rPr lang="en-US" smtClean="0"/>
               <a:pPr/>
-              <a:t>‹N›</a:t>
+              <a:t>‹#›</a:t>
             </a:fld>
             <a:endParaRPr lang="en-US" dirty="0"/>
           </a:p>
@@ -5846,7 +5846,7 @@
             <a:fld id="{D57F1E4F-1CFF-5643-939E-217C01CDF565}" type="slidenum">
               <a:rPr lang="en-US" smtClean="0"/>
               <a:pPr/>
-              <a:t>‹N›</a:t>
+              <a:t>‹#›</a:t>
             </a:fld>
             <a:endParaRPr lang="en-US" dirty="0"/>
           </a:p>
@@ -6325,7 +6325,7 @@
             <a:fld id="{D57F1E4F-1CFF-5643-939E-217C01CDF565}" type="slidenum">
               <a:rPr lang="en-US" smtClean="0"/>
               <a:pPr/>
-              <a:t>‹N›</a:t>
+              <a:t>‹#›</a:t>
             </a:fld>
             <a:endParaRPr lang="en-US" dirty="0"/>
           </a:p>
@@ -6548,7 +6548,7 @@
             <a:fld id="{D57F1E4F-1CFF-5643-939E-217C01CDF565}" type="slidenum">
               <a:rPr lang="en-US" smtClean="0"/>
               <a:pPr/>
-              <a:t>‹N›</a:t>
+              <a:t>‹#›</a:t>
             </a:fld>
             <a:endParaRPr lang="en-US" dirty="0"/>
           </a:p>
@@ -6645,7 +6645,7 @@
             <a:fld id="{D57F1E4F-1CFF-5643-939E-217C01CDF565}" type="slidenum">
               <a:rPr lang="en-US" smtClean="0"/>
               <a:pPr/>
-              <a:t>‹N›</a:t>
+              <a:t>‹#›</a:t>
             </a:fld>
             <a:endParaRPr lang="en-US" dirty="0"/>
           </a:p>
@@ -7090,7 +7090,7 @@
             <a:fld id="{D57F1E4F-1CFF-5643-939E-217C01CDF565}" type="slidenum">
               <a:rPr lang="en-US" smtClean="0"/>
               <a:pPr/>
-              <a:t>‹N›</a:t>
+              <a:t>‹#›</a:t>
             </a:fld>
             <a:endParaRPr lang="en-US" dirty="0"/>
           </a:p>
@@ -7415,7 +7415,7 @@
             <a:fld id="{D57F1E4F-1CFF-5643-939E-217C01CDF565}" type="slidenum">
               <a:rPr lang="en-US" smtClean="0"/>
               <a:pPr/>
-              <a:t>‹N›</a:t>
+              <a:t>‹#›</a:t>
             </a:fld>
             <a:endParaRPr lang="en-US" dirty="0"/>
           </a:p>
@@ -7674,7 +7674,7 @@
             <a:fld id="{D57F1E4F-1CFF-5643-939E-217C01CDF565}" type="slidenum">
               <a:rPr lang="en-US" smtClean="0"/>
               <a:pPr/>
-              <a:t>‹N›</a:t>
+              <a:t>‹#›</a:t>
             </a:fld>
             <a:endParaRPr lang="en-US" dirty="0"/>
           </a:p>
@@ -9135,6 +9135,13 @@
   <p:clrMapOvr>
     <a:masterClrMapping/>
   </p:clrMapOvr>
+  <p:timing>
+    <p:tnLst>
+      <p:par>
+        <p:cTn id="1" dur="indefinite" restart="never" nodeType="tmRoot"/>
+      </p:par>
+    </p:tnLst>
+  </p:timing>
 </p:sld>
 </file>
 
@@ -14170,6 +14177,13 @@
   <p:clrMapOvr>
     <a:masterClrMapping/>
   </p:clrMapOvr>
+  <p:timing>
+    <p:tnLst>
+      <p:par>
+        <p:cTn id="1" dur="indefinite" restart="never" nodeType="tmRoot"/>
+      </p:par>
+    </p:tnLst>
+  </p:timing>
 </p:sld>
 </file>
 
@@ -18025,6 +18039,13 @@
   <p:clrMapOvr>
     <a:masterClrMapping/>
   </p:clrMapOvr>
+  <p:timing>
+    <p:tnLst>
+      <p:par>
+        <p:cTn id="1" dur="indefinite" restart="never" nodeType="tmRoot"/>
+      </p:par>
+    </p:tnLst>
+  </p:timing>
 </p:sld>
 </file>
 
@@ -18224,27 +18245,21 @@
           <a:p>
             <a:r>
               <a:rPr lang="fr-CH" dirty="0" smtClean="0"/>
-              <a:t>Plusieurs modes à disposition du visiteur</a:t>
-            </a:r>
-          </a:p>
-          <a:p>
-            <a:pPr lvl="1"/>
+              <a:t>Nouveau </a:t>
+            </a:r>
             <a:r>
               <a:rPr lang="fr-CH" dirty="0" smtClean="0"/>
-              <a:t>Contamination</a:t>
-            </a:r>
-          </a:p>
-          <a:p>
-            <a:pPr lvl="1"/>
+              <a:t>concept : les danseurs se </a:t>
+            </a:r>
             <a:r>
               <a:rPr lang="fr-CH" dirty="0" smtClean="0"/>
-              <a:t>Contamination contrôlée</a:t>
+              <a:t>réveillent</a:t>
             </a:r>
           </a:p>
           <a:p>
             <a:r>
               <a:rPr lang="fr-CH" dirty="0" smtClean="0"/>
-              <a:t>Nouveau concept : les danseurs se réveillent</a:t>
+              <a:t>Concept : rechargement automatique</a:t>
             </a:r>
           </a:p>
           <a:p>
@@ -18252,6 +18267,7 @@
               <a:rPr lang="fr-CH" dirty="0" smtClean="0"/>
               <a:t>Arène</a:t>
             </a:r>
+            <a:endParaRPr lang="fr-CH" dirty="0" smtClean="0"/>
           </a:p>
           <a:p>
             <a:r>
@@ -18260,11 +18276,19 @@
             </a:r>
             <a:r>
               <a:rPr lang="fr-CH" dirty="0" smtClean="0"/>
-              <a:t> Pie </a:t>
-            </a:r>
-            <a:r>
-              <a:rPr lang="fr-CH" smtClean="0"/>
-              <a:t>et Phidget</a:t>
+              <a:t> </a:t>
+            </a:r>
+            <a:r>
+              <a:rPr lang="fr-CH" dirty="0" smtClean="0"/>
+              <a:t>Pi </a:t>
+            </a:r>
+            <a:r>
+              <a:rPr lang="fr-CH" dirty="0" smtClean="0"/>
+              <a:t>et </a:t>
+            </a:r>
+            <a:r>
+              <a:rPr lang="fr-CH" dirty="0" err="1" smtClean="0"/>
+              <a:t>Phidget</a:t>
             </a:r>
             <a:r>
               <a:rPr lang="fr-CH" dirty="0" smtClean="0"/>
@@ -18834,8 +18858,13 @@
           <a:p>
             <a:r>
               <a:rPr lang="fr-CH" dirty="0" smtClean="0"/>
-              <a:t>Nouvelle librairie</a:t>
-            </a:r>
+              <a:t>Nouvelle </a:t>
+            </a:r>
+            <a:r>
+              <a:rPr lang="fr-CH" dirty="0" smtClean="0"/>
+              <a:t>bibliothèque</a:t>
+            </a:r>
+            <a:endParaRPr lang="fr-CH" dirty="0" smtClean="0"/>
           </a:p>
           <a:p>
             <a:r>
@@ -22089,6 +22118,13 @@
   <p:clrMapOvr>
     <a:masterClrMapping/>
   </p:clrMapOvr>
+  <p:timing>
+    <p:tnLst>
+      <p:par>
+        <p:cTn id="1" dur="indefinite" restart="never" nodeType="tmRoot"/>
+      </p:par>
+    </p:tnLst>
+  </p:timing>
 </p:sld>
 </file>
 
@@ -22323,7 +22359,7 @@
   <a:extraClrSchemeLst/>
   <a:extLst>
     <a:ext uri="{05A4C25C-085E-4340-85A3-A5531E510DB2}">
-      <thm15:themeFamily xmlns="" xmlns:thm15="http://schemas.microsoft.com/office/thememl/2012/main" name="Quotable" id="{39EC5628-30ED-4578-ACD8-9820EDB8E15A}" vid="{6F3559E9-1A4C-49D8-94D4-F41003531C49}"/>
+      <thm15:themeFamily xmlns:thm15="http://schemas.microsoft.com/office/thememl/2012/main" name="Quotable" id="{39EC5628-30ED-4578-ACD8-9820EDB8E15A}" vid="{6F3559E9-1A4C-49D8-94D4-F41003531C49}"/>
     </a:ext>
   </a:extLst>
 </a:theme>
@@ -22584,7 +22620,7 @@
   <a:extraClrSchemeLst/>
   <a:extLst>
     <a:ext uri="{05A4C25C-085E-4340-85A3-A5531E510DB2}">
-      <thm15:themeFamily xmlns="" xmlns:thm15="http://schemas.microsoft.com/office/thememl/2012/main" name="Office Theme" id="{62F939B6-93AF-4DB8-9C6B-D6C7DFDC589F}" vid="{4A3C46E8-61CC-4603-A589-7422A47A8E4A}"/>
+      <thm15:themeFamily xmlns:thm15="http://schemas.microsoft.com/office/thememl/2012/main" name="Office Theme" id="{62F939B6-93AF-4DB8-9C6B-D6C7DFDC589F}" vid="{4A3C46E8-61CC-4603-A589-7422A47A8E4A}"/>
     </a:ext>
   </a:extLst>
 </a:theme>

</xml_diff>